<commit_message>
-Added course syllabus -Updated office hours
</commit_message>
<xml_diff>
--- a/agendas/2018-01-16 introduction/2018-01-16 introduction.pptx
+++ b/agendas/2018-01-16 introduction/2018-01-16 introduction.pptx
@@ -219,7 +219,7 @@
           <a:p>
             <a:fld id="{72D5C19B-83A8-4A25-B308-A328675A92FC}" type="datetimeFigureOut">
               <a:rPr lang="en-US" smtClean="0"/>
-              <a:t>1/17/2018</a:t>
+              <a:t>1/18/2018</a:t>
             </a:fld>
             <a:endParaRPr lang="en-US"/>
           </a:p>
@@ -617,7 +617,7 @@
           <a:p>
             <a:fld id="{5C169494-A7F3-4812-ADAA-B429089E3BC2}" type="datetimeFigureOut">
               <a:rPr lang="en-US" smtClean="0"/>
-              <a:t>1/17/2018</a:t>
+              <a:t>1/18/2018</a:t>
             </a:fld>
             <a:endParaRPr lang="en-US"/>
           </a:p>
@@ -787,7 +787,7 @@
           <a:p>
             <a:fld id="{5C169494-A7F3-4812-ADAA-B429089E3BC2}" type="datetimeFigureOut">
               <a:rPr lang="en-US" smtClean="0"/>
-              <a:t>1/17/2018</a:t>
+              <a:t>1/18/2018</a:t>
             </a:fld>
             <a:endParaRPr lang="en-US"/>
           </a:p>
@@ -967,7 +967,7 @@
           <a:p>
             <a:fld id="{5C169494-A7F3-4812-ADAA-B429089E3BC2}" type="datetimeFigureOut">
               <a:rPr lang="en-US" smtClean="0"/>
-              <a:t>1/17/2018</a:t>
+              <a:t>1/18/2018</a:t>
             </a:fld>
             <a:endParaRPr lang="en-US"/>
           </a:p>
@@ -1137,7 +1137,7 @@
           <a:p>
             <a:fld id="{5C169494-A7F3-4812-ADAA-B429089E3BC2}" type="datetimeFigureOut">
               <a:rPr lang="en-US" smtClean="0"/>
-              <a:t>1/17/2018</a:t>
+              <a:t>1/18/2018</a:t>
             </a:fld>
             <a:endParaRPr lang="en-US"/>
           </a:p>
@@ -1381,7 +1381,7 @@
           <a:p>
             <a:fld id="{5C169494-A7F3-4812-ADAA-B429089E3BC2}" type="datetimeFigureOut">
               <a:rPr lang="en-US" smtClean="0"/>
-              <a:t>1/17/2018</a:t>
+              <a:t>1/18/2018</a:t>
             </a:fld>
             <a:endParaRPr lang="en-US"/>
           </a:p>
@@ -1613,7 +1613,7 @@
           <a:p>
             <a:fld id="{5C169494-A7F3-4812-ADAA-B429089E3BC2}" type="datetimeFigureOut">
               <a:rPr lang="en-US" smtClean="0"/>
-              <a:t>1/17/2018</a:t>
+              <a:t>1/18/2018</a:t>
             </a:fld>
             <a:endParaRPr lang="en-US"/>
           </a:p>
@@ -1980,7 +1980,7 @@
           <a:p>
             <a:fld id="{5C169494-A7F3-4812-ADAA-B429089E3BC2}" type="datetimeFigureOut">
               <a:rPr lang="en-US" smtClean="0"/>
-              <a:t>1/17/2018</a:t>
+              <a:t>1/18/2018</a:t>
             </a:fld>
             <a:endParaRPr lang="en-US"/>
           </a:p>
@@ -2098,7 +2098,7 @@
           <a:p>
             <a:fld id="{5C169494-A7F3-4812-ADAA-B429089E3BC2}" type="datetimeFigureOut">
               <a:rPr lang="en-US" smtClean="0"/>
-              <a:t>1/17/2018</a:t>
+              <a:t>1/18/2018</a:t>
             </a:fld>
             <a:endParaRPr lang="en-US"/>
           </a:p>
@@ -2193,7 +2193,7 @@
           <a:p>
             <a:fld id="{5C169494-A7F3-4812-ADAA-B429089E3BC2}" type="datetimeFigureOut">
               <a:rPr lang="en-US" smtClean="0"/>
-              <a:t>1/17/2018</a:t>
+              <a:t>1/18/2018</a:t>
             </a:fld>
             <a:endParaRPr lang="en-US"/>
           </a:p>
@@ -2470,7 +2470,7 @@
           <a:p>
             <a:fld id="{5C169494-A7F3-4812-ADAA-B429089E3BC2}" type="datetimeFigureOut">
               <a:rPr lang="en-US" smtClean="0"/>
-              <a:t>1/17/2018</a:t>
+              <a:t>1/18/2018</a:t>
             </a:fld>
             <a:endParaRPr lang="en-US"/>
           </a:p>
@@ -2727,7 +2727,7 @@
           <a:p>
             <a:fld id="{5C169494-A7F3-4812-ADAA-B429089E3BC2}" type="datetimeFigureOut">
               <a:rPr lang="en-US" smtClean="0"/>
-              <a:t>1/17/2018</a:t>
+              <a:t>1/18/2018</a:t>
             </a:fld>
             <a:endParaRPr lang="en-US"/>
           </a:p>
@@ -2940,7 +2940,7 @@
           <a:p>
             <a:fld id="{5C169494-A7F3-4812-ADAA-B429089E3BC2}" type="datetimeFigureOut">
               <a:rPr lang="en-US" smtClean="0"/>
-              <a:t>1/17/2018</a:t>
+              <a:t>1/18/2018</a:t>
             </a:fld>
             <a:endParaRPr lang="en-US"/>
           </a:p>
@@ -6624,17 +6624,15 @@
             </a:r>
             <a:r>
               <a:rPr lang="en-US" dirty="0"/>
-              <a:t> (</a:t>
-            </a:r>
-            <a:r>
-              <a:rPr lang="en-US" dirty="0">
-                <a:hlinkClick r:id="rId2"/>
-              </a:rPr>
-              <a:t>https://github.com/acarteas/Teaching-DataStructures/tree/2018-Spring</a:t>
+              <a:t> </a:t>
+            </a:r>
+            <a:r>
+              <a:rPr lang="en-US" dirty="0" smtClean="0"/>
+              <a:t>(see link on canvas) will </a:t>
             </a:r>
             <a:r>
               <a:rPr lang="en-US" dirty="0"/>
-              <a:t>) will be used to store all course materials: course syllabus, official calendar, assignment descriptions, and other course documents</a:t>
+              <a:t>be used to store all course materials: course syllabus, official calendar, assignment descriptions, and other course documents</a:t>
             </a:r>
           </a:p>
         </p:txBody>
@@ -7014,21 +7012,32 @@
           </a:p>
         </p:txBody>
       </p:sp>
+      <p:sp>
+        <p:nvSpPr>
+          <p:cNvPr id="3" name="Content Placeholder 2"/>
+          <p:cNvSpPr>
+            <a:spLocks noGrp="1"/>
+          </p:cNvSpPr>
+          <p:nvPr>
+            <p:ph idx="1"/>
+          </p:nvPr>
+        </p:nvSpPr>
+        <p:spPr/>
+        <p:txBody>
+          <a:bodyPr/>
+          <a:lstStyle/>
+          <a:p>
+            <a:endParaRPr lang="en-US"/>
+          </a:p>
+        </p:txBody>
+      </p:sp>
       <p:pic>
         <p:nvPicPr>
-          <p:cNvPr id="5" name="Content Placeholder 4">
-            <a:extLst>
-              <a:ext uri="{FF2B5EF4-FFF2-40B4-BE49-F238E27FC236}">
-                <a16:creationId xmlns:a16="http://schemas.microsoft.com/office/drawing/2014/main" id="{8BC85005-430E-461F-B563-E17EBB6026F1}"/>
-              </a:ext>
-            </a:extLst>
-          </p:cNvPr>
+          <p:cNvPr id="4" name="Picture 3"/>
           <p:cNvPicPr>
-            <a:picLocks noGrp="1" noChangeAspect="1"/>
+            <a:picLocks noChangeAspect="1"/>
           </p:cNvPicPr>
-          <p:nvPr>
-            <p:ph idx="1"/>
-          </p:nvPr>
+          <p:nvPr/>
         </p:nvPicPr>
         <p:blipFill>
           <a:blip r:embed="rId2"/>
@@ -7038,8 +7047,8 @@
         </p:blipFill>
         <p:spPr>
           <a:xfrm>
-            <a:off x="2471422" y="1236492"/>
-            <a:ext cx="8328926" cy="5621508"/>
+            <a:off x="311064" y="1651739"/>
+            <a:ext cx="11569872" cy="4699110"/>
           </a:xfrm>
           <a:prstGeom prst="rect">
             <a:avLst/>

</xml_diff>